<commit_message>
new dataset for longitudinal example
</commit_message>
<xml_diff>
--- a/slides/Tag1_2Nachmittag_Nr2_Raschmodell_als_GLMM/03_Raschmodell_als_GLMM.pptx
+++ b/slides/Tag1_2Nachmittag_Nr2_Raschmodell_als_GLMM/03_Raschmodell_als_GLMM.pptx
@@ -315,7 +315,7 @@
               <a:pPr>
                 <a:defRPr/>
               </a:pPr>
-              <a:t>23.09.2024</a:t>
+              <a:t>01.10.2024</a:t>
             </a:fld>
             <a:endParaRPr lang="de-DE"/>
           </a:p>
@@ -513,7 +513,7 @@
               <a:pPr>
                 <a:defRPr/>
               </a:pPr>
-              <a:t>23.09.2024</a:t>
+              <a:t>01.10.2024</a:t>
             </a:fld>
             <a:endParaRPr lang="de-DE"/>
           </a:p>
@@ -7147,7 +7147,7 @@
               <a:pPr>
                 <a:defRPr/>
               </a:pPr>
-              <a:t>23.09.2024</a:t>
+              <a:t>01.10.2024</a:t>
             </a:fld>
             <a:endParaRPr lang="de-DE" dirty="0"/>
           </a:p>
@@ -19468,7 +19468,7 @@
           <a:graphicData uri="http://schemas.openxmlformats.org/presentationml/2006/ole">
             <mc:AlternateContent xmlns:mc="http://schemas.openxmlformats.org/markup-compatibility/2006">
               <mc:Choice xmlns:v="urn:schemas-microsoft-com:vml" Requires="v">
-                <p:oleObj spid="_x0000_s355368" name="Formel" r:id="rId4" imgW="1638300" imgH="228600" progId="Equation.3">
+                <p:oleObj spid="_x0000_s355376" name="Formel" r:id="rId4" imgW="1638300" imgH="228600" progId="Equation.3">
                   <p:embed/>
                 </p:oleObj>
               </mc:Choice>
@@ -19638,7 +19638,7 @@
           <a:graphicData uri="http://schemas.openxmlformats.org/presentationml/2006/ole">
             <mc:AlternateContent xmlns:mc="http://schemas.openxmlformats.org/markup-compatibility/2006">
               <mc:Choice xmlns:v="urn:schemas-microsoft-com:vml" Requires="v">
-                <p:oleObj spid="_x0000_s355369" r:id="rId6" imgW="2120900" imgH="444500" progId="Equation.3">
+                <p:oleObj spid="_x0000_s355377" r:id="rId6" imgW="2120900" imgH="444500" progId="Equation.3">
                   <p:embed/>
                 </p:oleObj>
               </mc:Choice>
@@ -19789,7 +19789,7 @@
           <a:graphicData uri="http://schemas.openxmlformats.org/presentationml/2006/ole">
             <mc:AlternateContent xmlns:mc="http://schemas.openxmlformats.org/markup-compatibility/2006">
               <mc:Choice xmlns:v="urn:schemas-microsoft-com:vml" Requires="v">
-                <p:oleObj spid="_x0000_s355370" r:id="rId8" imgW="2120900" imgH="444500" progId="Equation.3">
+                <p:oleObj spid="_x0000_s355378" r:id="rId8" imgW="2120900" imgH="444500" progId="Equation.3">
                   <p:embed/>
                 </p:oleObj>
               </mc:Choice>
@@ -19946,7 +19946,7 @@
           <a:graphicData uri="http://schemas.openxmlformats.org/presentationml/2006/ole">
             <mc:AlternateContent xmlns:mc="http://schemas.openxmlformats.org/markup-compatibility/2006">
               <mc:Choice xmlns:v="urn:schemas-microsoft-com:vml" Requires="v">
-                <p:oleObj spid="_x0000_s355371" r:id="rId9" imgW="914400" imgH="254000" progId="Equation.3">
+                <p:oleObj spid="_x0000_s355379" r:id="rId9" imgW="914400" imgH="254000" progId="Equation.3">
                   <p:embed/>
                 </p:oleObj>
               </mc:Choice>
@@ -22420,7 +22420,7 @@
           <a:graphicData uri="http://schemas.openxmlformats.org/presentationml/2006/ole">
             <mc:AlternateContent xmlns:mc="http://schemas.openxmlformats.org/markup-compatibility/2006">
               <mc:Choice xmlns:v="urn:schemas-microsoft-com:vml" Requires="v">
-                <p:oleObj spid="_x0000_s356377" r:id="rId4" imgW="800100" imgH="228600" progId="Equation.3">
+                <p:oleObj spid="_x0000_s356385" r:id="rId4" imgW="800100" imgH="228600" progId="Equation.3">
                   <p:embed/>
                 </p:oleObj>
               </mc:Choice>
@@ -22571,7 +22571,7 @@
           <a:graphicData uri="http://schemas.openxmlformats.org/presentationml/2006/ole">
             <mc:AlternateContent xmlns:mc="http://schemas.openxmlformats.org/markup-compatibility/2006">
               <mc:Choice xmlns:v="urn:schemas-microsoft-com:vml" Requires="v">
-                <p:oleObj spid="_x0000_s356378" r:id="rId6" imgW="1511300" imgH="482600" progId="Equation.3">
+                <p:oleObj spid="_x0000_s356386" r:id="rId6" imgW="1511300" imgH="482600" progId="Equation.3">
                   <p:embed/>
                 </p:oleObj>
               </mc:Choice>
@@ -22722,7 +22722,7 @@
           <a:graphicData uri="http://schemas.openxmlformats.org/presentationml/2006/ole">
             <mc:AlternateContent xmlns:mc="http://schemas.openxmlformats.org/markup-compatibility/2006">
               <mc:Choice xmlns:v="urn:schemas-microsoft-com:vml" Requires="v">
-                <p:oleObj spid="_x0000_s356379" r:id="rId8" imgW="1358900" imgH="228600" progId="Equation.3">
+                <p:oleObj spid="_x0000_s356387" r:id="rId8" imgW="1358900" imgH="228600" progId="Equation.3">
                   <p:embed/>
                 </p:oleObj>
               </mc:Choice>
@@ -22873,7 +22873,7 @@
           <a:graphicData uri="http://schemas.openxmlformats.org/presentationml/2006/ole">
             <mc:AlternateContent xmlns:mc="http://schemas.openxmlformats.org/markup-compatibility/2006">
               <mc:Choice xmlns:v="urn:schemas-microsoft-com:vml" Requires="v">
-                <p:oleObj spid="_x0000_s356380" r:id="rId10" imgW="1130300" imgH="228600" progId="Equation.3">
+                <p:oleObj spid="_x0000_s356388" r:id="rId10" imgW="1130300" imgH="228600" progId="Equation.3">
                   <p:embed/>
                 </p:oleObj>
               </mc:Choice>
@@ -23950,11 +23950,113 @@
               </a:rPr>
               <a:t>Personenseite</a:t>
             </a:r>
+            <a:endParaRPr lang="en-US" altLang="de-DE" sz="1400" dirty="0">
+              <a:latin typeface="Calibri" pitchFamily="34" charset="0"/>
+            </a:endParaRPr>
+          </a:p>
+          <a:p>
+            <a:pPr lvl="2">
+              <a:lnSpc>
+                <a:spcPct val="114000"/>
+              </a:lnSpc>
+              <a:spcBef>
+                <a:spcPts val="600"/>
+              </a:spcBef>
+              <a:buClr>
+                <a:srgbClr val="A61B1E"/>
+              </a:buClr>
+              <a:buFontTx/>
+              <a:buChar char="–"/>
+            </a:pPr>
+            <a:r>
+              <a:rPr lang="en-US" altLang="de-DE" sz="1400" dirty="0" err="1">
+                <a:latin typeface="Calibri" pitchFamily="34" charset="0"/>
+              </a:rPr>
+              <a:t>Prädiktoren</a:t>
+            </a:r>
             <a:r>
               <a:rPr lang="en-US" altLang="de-DE" sz="1400" dirty="0">
                 <a:latin typeface="Calibri" pitchFamily="34" charset="0"/>
               </a:rPr>
               <a:t> </a:t>
+            </a:r>
+            <a:r>
+              <a:rPr lang="en-US" altLang="de-DE" sz="1400" dirty="0" err="1">
+                <a:latin typeface="Calibri" pitchFamily="34" charset="0"/>
+              </a:rPr>
+              <a:t>müssen</a:t>
+            </a:r>
+            <a:r>
+              <a:rPr lang="en-US" altLang="de-DE" sz="1400" dirty="0">
+                <a:latin typeface="Calibri" pitchFamily="34" charset="0"/>
+              </a:rPr>
+              <a:t> </a:t>
+            </a:r>
+            <a:r>
+              <a:rPr lang="en-US" altLang="de-DE" sz="1400" dirty="0" err="1">
+                <a:latin typeface="Calibri" pitchFamily="34" charset="0"/>
+              </a:rPr>
+              <a:t>immer</a:t>
+            </a:r>
+            <a:r>
+              <a:rPr lang="en-US" altLang="de-DE" sz="1400" dirty="0">
+                <a:latin typeface="Calibri" pitchFamily="34" charset="0"/>
+              </a:rPr>
+              <a:t> manifest sein </a:t>
+            </a:r>
+          </a:p>
+          <a:p>
+            <a:pPr lvl="2">
+              <a:lnSpc>
+                <a:spcPct val="114000"/>
+              </a:lnSpc>
+              <a:spcBef>
+                <a:spcPts val="600"/>
+              </a:spcBef>
+              <a:buClr>
+                <a:srgbClr val="A61B1E"/>
+              </a:buClr>
+              <a:buFontTx/>
+              <a:buChar char="–"/>
+            </a:pPr>
+            <a:r>
+              <a:rPr lang="en-US" altLang="de-DE" sz="1400" b="1" dirty="0">
+                <a:latin typeface="Calibri" pitchFamily="34" charset="0"/>
+              </a:rPr>
+              <a:t>UVs:</a:t>
+            </a:r>
+            <a:r>
+              <a:rPr lang="en-US" altLang="de-DE" sz="1400" dirty="0">
+                <a:latin typeface="Calibri" pitchFamily="34" charset="0"/>
+              </a:rPr>
+              <a:t> manifest</a:t>
+            </a:r>
+          </a:p>
+          <a:p>
+            <a:pPr lvl="2">
+              <a:lnSpc>
+                <a:spcPct val="114000"/>
+              </a:lnSpc>
+              <a:spcBef>
+                <a:spcPts val="600"/>
+              </a:spcBef>
+              <a:buClr>
+                <a:srgbClr val="A61B1E"/>
+              </a:buClr>
+              <a:buFontTx/>
+              <a:buChar char="–"/>
+            </a:pPr>
+            <a:r>
+              <a:rPr lang="en-US" altLang="de-DE" sz="1400" b="1" dirty="0">
+                <a:latin typeface="Calibri" pitchFamily="34" charset="0"/>
+              </a:rPr>
+              <a:t>AVs:</a:t>
+            </a:r>
+            <a:r>
+              <a:rPr lang="en-US" altLang="de-DE" sz="1400" dirty="0">
+                <a:latin typeface="Calibri" pitchFamily="34" charset="0"/>
+              </a:rPr>
+              <a:t> latent</a:t>
             </a:r>
           </a:p>
           <a:p>
@@ -24659,7 +24761,7 @@
           <a:graphicData uri="http://schemas.openxmlformats.org/presentationml/2006/ole">
             <mc:AlternateContent xmlns:mc="http://schemas.openxmlformats.org/markup-compatibility/2006">
               <mc:Choice xmlns:v="urn:schemas-microsoft-com:vml" Requires="v">
-                <p:oleObj spid="_x0000_s354337" name="Formel" r:id="rId4" imgW="1638300" imgH="228600" progId="Equation.3">
+                <p:oleObj spid="_x0000_s354343" name="Formel" r:id="rId4" imgW="1638300" imgH="228600" progId="Equation.3">
                   <p:embed/>
                 </p:oleObj>
               </mc:Choice>
@@ -24829,7 +24931,7 @@
           <a:graphicData uri="http://schemas.openxmlformats.org/presentationml/2006/ole">
             <mc:AlternateContent xmlns:mc="http://schemas.openxmlformats.org/markup-compatibility/2006">
               <mc:Choice xmlns:v="urn:schemas-microsoft-com:vml" Requires="v">
-                <p:oleObj spid="_x0000_s354338" r:id="rId6" imgW="876300" imgH="228600" progId="Equation.3">
+                <p:oleObj spid="_x0000_s354344" r:id="rId6" imgW="876300" imgH="228600" progId="Equation.3">
                   <p:embed/>
                 </p:oleObj>
               </mc:Choice>
@@ -24980,7 +25082,7 @@
           <a:graphicData uri="http://schemas.openxmlformats.org/presentationml/2006/ole">
             <mc:AlternateContent xmlns:mc="http://schemas.openxmlformats.org/markup-compatibility/2006">
               <mc:Choice xmlns:v="urn:schemas-microsoft-com:vml" Requires="v">
-                <p:oleObj spid="_x0000_s354339" r:id="rId8" imgW="876300" imgH="241300" progId="Equation.3">
+                <p:oleObj spid="_x0000_s354345" r:id="rId8" imgW="876300" imgH="241300" progId="Equation.3">
                   <p:embed/>
                 </p:oleObj>
               </mc:Choice>
@@ -25466,6 +25568,153 @@
                                     <p:set>
                                       <p:cBhvr>
                                         <p:cTn id="38" dur="1" fill="hold">
+                                          <p:stCondLst>
+                                            <p:cond delay="0"/>
+                                          </p:stCondLst>
+                                        </p:cTn>
+                                        <p:tgtEl>
+                                          <p:spTgt spid="4">
+                                            <p:txEl>
+                                              <p:pRg st="9" end="9"/>
+                                            </p:txEl>
+                                          </p:spTgt>
+                                        </p:tgtEl>
+                                        <p:attrNameLst>
+                                          <p:attrName>style.visibility</p:attrName>
+                                        </p:attrNameLst>
+                                      </p:cBhvr>
+                                      <p:to>
+                                        <p:strVal val="visible"/>
+                                      </p:to>
+                                    </p:set>
+                                  </p:childTnLst>
+                                </p:cTn>
+                              </p:par>
+                            </p:childTnLst>
+                          </p:cTn>
+                        </p:par>
+                      </p:childTnLst>
+                    </p:cTn>
+                  </p:par>
+                  <p:par>
+                    <p:cTn id="39" fill="hold">
+                      <p:stCondLst>
+                        <p:cond delay="indefinite"/>
+                      </p:stCondLst>
+                      <p:childTnLst>
+                        <p:par>
+                          <p:cTn id="40" fill="hold">
+                            <p:stCondLst>
+                              <p:cond delay="0"/>
+                            </p:stCondLst>
+                            <p:childTnLst>
+                              <p:par>
+                                <p:cTn id="41" presetID="1" presetClass="entr" presetSubtype="0" fill="hold" nodeType="clickEffect">
+                                  <p:stCondLst>
+                                    <p:cond delay="0"/>
+                                  </p:stCondLst>
+                                  <p:childTnLst>
+                                    <p:set>
+                                      <p:cBhvr>
+                                        <p:cTn id="42" dur="1" fill="hold">
+                                          <p:stCondLst>
+                                            <p:cond delay="0"/>
+                                          </p:stCondLst>
+                                        </p:cTn>
+                                        <p:tgtEl>
+                                          <p:spTgt spid="4">
+                                            <p:txEl>
+                                              <p:pRg st="10" end="10"/>
+                                            </p:txEl>
+                                          </p:spTgt>
+                                        </p:tgtEl>
+                                        <p:attrNameLst>
+                                          <p:attrName>style.visibility</p:attrName>
+                                        </p:attrNameLst>
+                                      </p:cBhvr>
+                                      <p:to>
+                                        <p:strVal val="visible"/>
+                                      </p:to>
+                                    </p:set>
+                                  </p:childTnLst>
+                                </p:cTn>
+                              </p:par>
+                            </p:childTnLst>
+                          </p:cTn>
+                        </p:par>
+                      </p:childTnLst>
+                    </p:cTn>
+                  </p:par>
+                  <p:par>
+                    <p:cTn id="43" fill="hold">
+                      <p:stCondLst>
+                        <p:cond delay="indefinite"/>
+                      </p:stCondLst>
+                      <p:childTnLst>
+                        <p:par>
+                          <p:cTn id="44" fill="hold">
+                            <p:stCondLst>
+                              <p:cond delay="0"/>
+                            </p:stCondLst>
+                            <p:childTnLst>
+                              <p:par>
+                                <p:cTn id="45" presetID="1" presetClass="entr" presetSubtype="0" fill="hold" nodeType="clickEffect">
+                                  <p:stCondLst>
+                                    <p:cond delay="0"/>
+                                  </p:stCondLst>
+                                  <p:childTnLst>
+                                    <p:set>
+                                      <p:cBhvr>
+                                        <p:cTn id="46" dur="1" fill="hold">
+                                          <p:stCondLst>
+                                            <p:cond delay="0"/>
+                                          </p:stCondLst>
+                                        </p:cTn>
+                                        <p:tgtEl>
+                                          <p:spTgt spid="4">
+                                            <p:txEl>
+                                              <p:pRg st="11" end="11"/>
+                                            </p:txEl>
+                                          </p:spTgt>
+                                        </p:tgtEl>
+                                        <p:attrNameLst>
+                                          <p:attrName>style.visibility</p:attrName>
+                                        </p:attrNameLst>
+                                      </p:cBhvr>
+                                      <p:to>
+                                        <p:strVal val="visible"/>
+                                      </p:to>
+                                    </p:set>
+                                  </p:childTnLst>
+                                </p:cTn>
+                              </p:par>
+                            </p:childTnLst>
+                          </p:cTn>
+                        </p:par>
+                      </p:childTnLst>
+                    </p:cTn>
+                  </p:par>
+                  <p:par>
+                    <p:cTn id="47" fill="hold">
+                      <p:stCondLst>
+                        <p:cond delay="indefinite"/>
+                      </p:stCondLst>
+                      <p:childTnLst>
+                        <p:par>
+                          <p:cTn id="48" fill="hold">
+                            <p:stCondLst>
+                              <p:cond delay="0"/>
+                            </p:stCondLst>
+                            <p:childTnLst>
+                              <p:par>
+                                <p:cTn id="49" presetID="1" presetClass="entr" presetSubtype="0" fill="hold" nodeType="clickEffect">
+                                  <p:stCondLst>
+                                    <p:cond delay="0"/>
+                                  </p:stCondLst>
+                                  <p:childTnLst>
+                                    <p:set>
+                                      <p:cBhvr>
+                                        <p:cTn id="50" dur="1" fill="hold">
                                           <p:stCondLst>
                                             <p:cond delay="0"/>
                                           </p:stCondLst>

</xml_diff>